<commit_message>
Modified to include Guardrail conditional check
</commit_message>
<xml_diff>
--- a/resource/Flow.pptx
+++ b/resource/Flow.pptx
@@ -261,7 +261,7 @@
           <a:p>
             <a:fld id="{40702933-6B89-C14D-8922-0C3E06E4BB98}" type="datetimeFigureOut">
               <a:rPr lang="en-US" smtClean="0"/>
-              <a:t>11/7/24</a:t>
+              <a:t>11/10/24</a:t>
             </a:fld>
             <a:endParaRPr lang="en-US"/>
           </a:p>
@@ -461,7 +461,7 @@
           <a:p>
             <a:fld id="{40702933-6B89-C14D-8922-0C3E06E4BB98}" type="datetimeFigureOut">
               <a:rPr lang="en-US" smtClean="0"/>
-              <a:t>11/7/24</a:t>
+              <a:t>11/10/24</a:t>
             </a:fld>
             <a:endParaRPr lang="en-US"/>
           </a:p>
@@ -671,7 +671,7 @@
           <a:p>
             <a:fld id="{40702933-6B89-C14D-8922-0C3E06E4BB98}" type="datetimeFigureOut">
               <a:rPr lang="en-US" smtClean="0"/>
-              <a:t>11/7/24</a:t>
+              <a:t>11/10/24</a:t>
             </a:fld>
             <a:endParaRPr lang="en-US"/>
           </a:p>
@@ -871,7 +871,7 @@
           <a:p>
             <a:fld id="{40702933-6B89-C14D-8922-0C3E06E4BB98}" type="datetimeFigureOut">
               <a:rPr lang="en-US" smtClean="0"/>
-              <a:t>11/7/24</a:t>
+              <a:t>11/10/24</a:t>
             </a:fld>
             <a:endParaRPr lang="en-US"/>
           </a:p>
@@ -1147,7 +1147,7 @@
           <a:p>
             <a:fld id="{40702933-6B89-C14D-8922-0C3E06E4BB98}" type="datetimeFigureOut">
               <a:rPr lang="en-US" smtClean="0"/>
-              <a:t>11/7/24</a:t>
+              <a:t>11/10/24</a:t>
             </a:fld>
             <a:endParaRPr lang="en-US"/>
           </a:p>
@@ -1415,7 +1415,7 @@
           <a:p>
             <a:fld id="{40702933-6B89-C14D-8922-0C3E06E4BB98}" type="datetimeFigureOut">
               <a:rPr lang="en-US" smtClean="0"/>
-              <a:t>11/7/24</a:t>
+              <a:t>11/10/24</a:t>
             </a:fld>
             <a:endParaRPr lang="en-US"/>
           </a:p>
@@ -1830,7 +1830,7 @@
           <a:p>
             <a:fld id="{40702933-6B89-C14D-8922-0C3E06E4BB98}" type="datetimeFigureOut">
               <a:rPr lang="en-US" smtClean="0"/>
-              <a:t>11/7/24</a:t>
+              <a:t>11/10/24</a:t>
             </a:fld>
             <a:endParaRPr lang="en-US"/>
           </a:p>
@@ -1972,7 +1972,7 @@
           <a:p>
             <a:fld id="{40702933-6B89-C14D-8922-0C3E06E4BB98}" type="datetimeFigureOut">
               <a:rPr lang="en-US" smtClean="0"/>
-              <a:t>11/7/24</a:t>
+              <a:t>11/10/24</a:t>
             </a:fld>
             <a:endParaRPr lang="en-US"/>
           </a:p>
@@ -2085,7 +2085,7 @@
           <a:p>
             <a:fld id="{40702933-6B89-C14D-8922-0C3E06E4BB98}" type="datetimeFigureOut">
               <a:rPr lang="en-US" smtClean="0"/>
-              <a:t>11/7/24</a:t>
+              <a:t>11/10/24</a:t>
             </a:fld>
             <a:endParaRPr lang="en-US"/>
           </a:p>
@@ -2398,7 +2398,7 @@
           <a:p>
             <a:fld id="{40702933-6B89-C14D-8922-0C3E06E4BB98}" type="datetimeFigureOut">
               <a:rPr lang="en-US" smtClean="0"/>
-              <a:t>11/7/24</a:t>
+              <a:t>11/10/24</a:t>
             </a:fld>
             <a:endParaRPr lang="en-US"/>
           </a:p>
@@ -2687,7 +2687,7 @@
           <a:p>
             <a:fld id="{40702933-6B89-C14D-8922-0C3E06E4BB98}" type="datetimeFigureOut">
               <a:rPr lang="en-US" smtClean="0"/>
-              <a:t>11/7/24</a:t>
+              <a:t>11/10/24</a:t>
             </a:fld>
             <a:endParaRPr lang="en-US"/>
           </a:p>
@@ -2930,7 +2930,7 @@
           <a:p>
             <a:fld id="{40702933-6B89-C14D-8922-0C3E06E4BB98}" type="datetimeFigureOut">
               <a:rPr lang="en-US" smtClean="0"/>
-              <a:t>11/7/24</a:t>
+              <a:t>11/10/24</a:t>
             </a:fld>
             <a:endParaRPr lang="en-US"/>
           </a:p>
@@ -3361,14 +3361,14 @@
         </p:nvSpPr>
         <p:spPr>
           <a:xfrm>
-            <a:off x="2611736" y="3443475"/>
+            <a:off x="3594905" y="3411977"/>
             <a:ext cx="471487" cy="428625"/>
           </a:xfrm>
           <a:prstGeom prst="ellipse">
             <a:avLst/>
           </a:prstGeom>
           <a:solidFill>
-            <a:srgbClr val="FFC000"/>
+            <a:schemeClr val="accent4"/>
           </a:solidFill>
           <a:ln w="38100">
             <a:solidFill>
@@ -3415,7 +3415,7 @@
         </p:nvSpPr>
         <p:spPr>
           <a:xfrm>
-            <a:off x="2469417" y="2872954"/>
+            <a:off x="3452586" y="2841456"/>
             <a:ext cx="1040068" cy="461665"/>
           </a:xfrm>
           <a:prstGeom prst="rect">
@@ -3452,14 +3452,14 @@
         </p:nvSpPr>
         <p:spPr>
           <a:xfrm>
-            <a:off x="3912422" y="3426708"/>
+            <a:off x="4895591" y="3395210"/>
             <a:ext cx="471487" cy="428625"/>
           </a:xfrm>
           <a:prstGeom prst="ellipse">
             <a:avLst/>
           </a:prstGeom>
           <a:solidFill>
-            <a:srgbClr val="FFC000"/>
+            <a:schemeClr val="accent4"/>
           </a:solidFill>
           <a:ln w="38100">
             <a:solidFill>
@@ -3503,18 +3503,19 @@
           </p:cNvPr>
           <p:cNvCxnSpPr>
             <a:cxnSpLocks/>
+            <a:stCxn id="4" idx="6"/>
           </p:cNvCxnSpPr>
           <p:nvPr/>
         </p:nvCxnSpPr>
         <p:spPr>
-          <a:xfrm flipV="1">
-            <a:off x="3074191" y="3657788"/>
-            <a:ext cx="838231" cy="1"/>
+          <a:xfrm>
+            <a:off x="4066392" y="3626290"/>
+            <a:ext cx="829199" cy="0"/>
           </a:xfrm>
           <a:prstGeom prst="straightConnector1">
             <a:avLst/>
           </a:prstGeom>
-          <a:ln w="19050">
+          <a:ln w="28575">
             <a:tailEnd type="triangle"/>
           </a:ln>
         </p:spPr>
@@ -3547,7 +3548,7 @@
         </p:nvSpPr>
         <p:spPr>
           <a:xfrm>
-            <a:off x="3773216" y="2877498"/>
+            <a:off x="4756385" y="2846000"/>
             <a:ext cx="929668" cy="461665"/>
           </a:xfrm>
           <a:prstGeom prst="rect">
@@ -3584,7 +3585,7 @@
         </p:nvSpPr>
         <p:spPr>
           <a:xfrm>
-            <a:off x="0" y="3519285"/>
+            <a:off x="-20354" y="4364345"/>
             <a:ext cx="955711" cy="276999"/>
           </a:xfrm>
           <a:prstGeom prst="rect">
@@ -3609,10 +3610,10 @@
       </p:sp>
       <p:cxnSp>
         <p:nvCxnSpPr>
-          <p:cNvPr id="12" name="Straight Arrow Connector 11">
-            <a:extLst>
-              <a:ext uri="{FF2B5EF4-FFF2-40B4-BE49-F238E27FC236}">
-                <a16:creationId xmlns:a16="http://schemas.microsoft.com/office/drawing/2014/main" id="{12A87E66-7BD3-93A9-0FF3-DC5753623795}"/>
+          <p:cNvPr id="17" name="Straight Arrow Connector 16">
+            <a:extLst>
+              <a:ext uri="{FF2B5EF4-FFF2-40B4-BE49-F238E27FC236}">
+                <a16:creationId xmlns:a16="http://schemas.microsoft.com/office/drawing/2014/main" id="{5C0CBDC3-3B79-FAB3-0B68-589AABB7D5D7}"/>
               </a:ext>
             </a:extLst>
           </p:cNvPr>
@@ -3622,14 +3623,14 @@
           <p:nvPr/>
         </p:nvCxnSpPr>
         <p:spPr>
-          <a:xfrm>
-            <a:off x="1904095" y="3657785"/>
-            <a:ext cx="718878" cy="2"/>
+          <a:xfrm flipV="1">
+            <a:off x="5366269" y="3588798"/>
+            <a:ext cx="786053" cy="23016"/>
           </a:xfrm>
           <a:prstGeom prst="straightConnector1">
             <a:avLst/>
           </a:prstGeom>
-          <a:ln w="19050">
+          <a:ln w="28575">
             <a:tailEnd type="triangle"/>
           </a:ln>
         </p:spPr>
@@ -3648,47 +3649,6 @@
           </a:fontRef>
         </p:style>
       </p:cxnSp>
-      <p:cxnSp>
-        <p:nvCxnSpPr>
-          <p:cNvPr id="17" name="Straight Arrow Connector 16">
-            <a:extLst>
-              <a:ext uri="{FF2B5EF4-FFF2-40B4-BE49-F238E27FC236}">
-                <a16:creationId xmlns:a16="http://schemas.microsoft.com/office/drawing/2014/main" id="{5C0CBDC3-3B79-FAB3-0B68-589AABB7D5D7}"/>
-              </a:ext>
-            </a:extLst>
-          </p:cNvPr>
-          <p:cNvCxnSpPr>
-            <a:cxnSpLocks/>
-          </p:cNvCxnSpPr>
-          <p:nvPr/>
-        </p:nvCxnSpPr>
-        <p:spPr>
-          <a:xfrm flipV="1">
-            <a:off x="4383100" y="3620296"/>
-            <a:ext cx="786053" cy="23016"/>
-          </a:xfrm>
-          <a:prstGeom prst="straightConnector1">
-            <a:avLst/>
-          </a:prstGeom>
-          <a:ln w="19050">
-            <a:tailEnd type="triangle"/>
-          </a:ln>
-        </p:spPr>
-        <p:style>
-          <a:lnRef idx="1">
-            <a:schemeClr val="accent1"/>
-          </a:lnRef>
-          <a:fillRef idx="0">
-            <a:schemeClr val="accent1"/>
-          </a:fillRef>
-          <a:effectRef idx="0">
-            <a:schemeClr val="accent1"/>
-          </a:effectRef>
-          <a:fontRef idx="minor">
-            <a:schemeClr val="tx1"/>
-          </a:fontRef>
-        </p:style>
-      </p:cxnSp>
       <p:sp>
         <p:nvSpPr>
           <p:cNvPr id="20" name="TextBox 19">
@@ -3703,8 +3663,8 @@
         </p:nvSpPr>
         <p:spPr>
           <a:xfrm>
-            <a:off x="5771892" y="3430977"/>
-            <a:ext cx="1420582" cy="461665"/>
+            <a:off x="6821542" y="3348687"/>
+            <a:ext cx="2293246" cy="461665"/>
           </a:xfrm>
           <a:prstGeom prst="rect">
             <a:avLst/>
@@ -3712,7 +3672,7 @@
           <a:noFill/>
         </p:spPr>
         <p:txBody>
-          <a:bodyPr wrap="none" rtlCol="0">
+          <a:bodyPr wrap="square" rtlCol="0">
             <a:spAutoFit/>
           </a:bodyPr>
           <a:lstStyle/>
@@ -3724,18 +3684,24 @@
                 </a:solidFill>
                 <a:latin typeface="Lucida Handwriting" panose="03010101010101010101" pitchFamily="66" charset="77"/>
               </a:rPr>
-              <a:t>Is any Chunk </a:t>
-            </a:r>
-          </a:p>
-          <a:p>
-            <a:r>
+              <a:t>Is any </a:t>
+            </a:r>
+            <a:br>
               <a:rPr lang="en-US" sz="1200" b="1" dirty="0">
                 <a:solidFill>
                   <a:schemeClr val="accent2"/>
                 </a:solidFill>
                 <a:latin typeface="Lucida Handwriting" panose="03010101010101010101" pitchFamily="66" charset="77"/>
               </a:rPr>
-              <a:t>Relevant ?</a:t>
+            </a:br>
+            <a:r>
+              <a:rPr lang="en-US" sz="1200" b="1" dirty="0">
+                <a:solidFill>
+                  <a:schemeClr val="accent2"/>
+                </a:solidFill>
+                <a:latin typeface="Lucida Handwriting" panose="03010101010101010101" pitchFamily="66" charset="77"/>
+              </a:rPr>
+              <a:t>Chunk Relevant ?</a:t>
             </a:r>
           </a:p>
         </p:txBody>
@@ -3754,14 +3720,14 @@
         </p:nvSpPr>
         <p:spPr>
           <a:xfrm>
-            <a:off x="6621702" y="2389207"/>
+            <a:off x="7268353" y="2477105"/>
             <a:ext cx="471487" cy="428625"/>
           </a:xfrm>
           <a:prstGeom prst="ellipse">
             <a:avLst/>
           </a:prstGeom>
           <a:solidFill>
-            <a:srgbClr val="FFC000"/>
+            <a:schemeClr val="accent4"/>
           </a:solidFill>
           <a:ln w="38100">
             <a:solidFill>
@@ -3811,13 +3777,13 @@
         </p:nvCxnSpPr>
         <p:spPr>
           <a:xfrm flipV="1">
-            <a:off x="5570299" y="2603520"/>
-            <a:ext cx="1051403" cy="901291"/>
+            <a:off x="6543256" y="2691418"/>
+            <a:ext cx="725097" cy="792357"/>
           </a:xfrm>
           <a:prstGeom prst="straightConnector1">
             <a:avLst/>
           </a:prstGeom>
-          <a:ln w="19050">
+          <a:ln w="28575">
             <a:tailEnd type="triangle"/>
           </a:ln>
         </p:spPr>
@@ -3850,7 +3816,7 @@
         </p:nvSpPr>
         <p:spPr>
           <a:xfrm>
-            <a:off x="5753397" y="2814051"/>
+            <a:off x="6230838" y="2908603"/>
             <a:ext cx="429926" cy="276999"/>
           </a:xfrm>
           <a:prstGeom prst="rect">
@@ -3890,7 +3856,7 @@
         </p:nvSpPr>
         <p:spPr>
           <a:xfrm>
-            <a:off x="6146353" y="2023394"/>
+            <a:off x="6621826" y="2144605"/>
             <a:ext cx="1619354" cy="276999"/>
           </a:xfrm>
           <a:prstGeom prst="rect">
@@ -3927,7 +3893,7 @@
         </p:nvSpPr>
         <p:spPr>
           <a:xfrm>
-            <a:off x="6621702" y="4224759"/>
+            <a:off x="7225505" y="4198353"/>
             <a:ext cx="670349" cy="358816"/>
           </a:xfrm>
           <a:prstGeom prst="roundRect">
@@ -3982,13 +3948,13 @@
         </p:nvCxnSpPr>
         <p:spPr>
           <a:xfrm>
-            <a:off x="5570299" y="3720759"/>
-            <a:ext cx="1051403" cy="683408"/>
+            <a:off x="6572163" y="3687917"/>
+            <a:ext cx="653342" cy="689844"/>
           </a:xfrm>
           <a:prstGeom prst="straightConnector1">
             <a:avLst/>
           </a:prstGeom>
-          <a:ln w="19050">
+          <a:ln w="28575">
             <a:tailEnd type="triangle"/>
           </a:ln>
         </p:spPr>
@@ -4021,14 +3987,14 @@
         </p:nvSpPr>
         <p:spPr>
           <a:xfrm>
-            <a:off x="8325110" y="2389207"/>
+            <a:off x="8682517" y="2433812"/>
             <a:ext cx="471487" cy="428625"/>
           </a:xfrm>
           <a:prstGeom prst="ellipse">
             <a:avLst/>
           </a:prstGeom>
           <a:solidFill>
-            <a:srgbClr val="FFC000"/>
+            <a:schemeClr val="accent4"/>
           </a:solidFill>
           <a:ln w="28575">
             <a:solidFill>
@@ -4072,20 +4038,19 @@
           </p:cNvPr>
           <p:cNvCxnSpPr>
             <a:cxnSpLocks/>
-            <a:stCxn id="21" idx="6"/>
             <a:endCxn id="34" idx="2"/>
           </p:cNvCxnSpPr>
           <p:nvPr/>
         </p:nvCxnSpPr>
         <p:spPr>
           <a:xfrm>
-            <a:off x="7093189" y="2603520"/>
-            <a:ext cx="1231921" cy="0"/>
+            <a:off x="7739514" y="2648124"/>
+            <a:ext cx="943003" cy="1"/>
           </a:xfrm>
           <a:prstGeom prst="straightConnector1">
             <a:avLst/>
           </a:prstGeom>
-          <a:ln w="19050">
+          <a:ln w="28575">
             <a:tailEnd type="triangle"/>
           </a:ln>
         </p:spPr>
@@ -4118,7 +4083,7 @@
         </p:nvSpPr>
         <p:spPr>
           <a:xfrm>
-            <a:off x="7853623" y="1927542"/>
+            <a:off x="8211030" y="1972147"/>
             <a:ext cx="1449436" cy="461665"/>
           </a:xfrm>
           <a:prstGeom prst="rect">
@@ -4165,8 +4130,8 @@
         </p:nvSpPr>
         <p:spPr>
           <a:xfrm>
-            <a:off x="9557031" y="2343041"/>
-            <a:ext cx="532435" cy="520957"/>
+            <a:off x="9856227" y="2266758"/>
+            <a:ext cx="532435" cy="762733"/>
           </a:xfrm>
           <a:prstGeom prst="diamond">
             <a:avLst/>
@@ -4217,7 +4182,7 @@
         </p:nvSpPr>
         <p:spPr>
           <a:xfrm>
-            <a:off x="11002150" y="3207983"/>
+            <a:off x="10829999" y="3642108"/>
             <a:ext cx="670349" cy="358816"/>
           </a:xfrm>
           <a:prstGeom prst="roundRect">
@@ -4266,19 +4231,18 @@
           </p:cNvPr>
           <p:cNvCxnSpPr>
             <a:cxnSpLocks/>
-            <a:endCxn id="41" idx="1"/>
           </p:cNvCxnSpPr>
           <p:nvPr/>
         </p:nvCxnSpPr>
         <p:spPr>
           <a:xfrm>
-            <a:off x="9950747" y="2703983"/>
-            <a:ext cx="1051403" cy="683408"/>
+            <a:off x="10262702" y="2806241"/>
+            <a:ext cx="567297" cy="823188"/>
           </a:xfrm>
           <a:prstGeom prst="straightConnector1">
             <a:avLst/>
           </a:prstGeom>
-          <a:ln w="19050">
+          <a:ln w="28575">
             <a:tailEnd type="triangle"/>
           </a:ln>
         </p:spPr>
@@ -4315,13 +4279,13 @@
         </p:nvCxnSpPr>
         <p:spPr>
           <a:xfrm>
-            <a:off x="8796597" y="2603520"/>
-            <a:ext cx="760434" cy="0"/>
+            <a:off x="9154004" y="2648125"/>
+            <a:ext cx="702223" cy="0"/>
           </a:xfrm>
           <a:prstGeom prst="straightConnector1">
             <a:avLst/>
           </a:prstGeom>
-          <a:ln w="19050">
+          <a:ln w="28575">
             <a:tailEnd type="triangle"/>
           </a:ln>
         </p:spPr>
@@ -4354,8 +4318,8 @@
         </p:nvSpPr>
         <p:spPr>
           <a:xfrm>
-            <a:off x="10089466" y="2986003"/>
-            <a:ext cx="429926" cy="276999"/>
+            <a:off x="10154011" y="3118211"/>
+            <a:ext cx="439454" cy="276999"/>
           </a:xfrm>
           <a:prstGeom prst="rect">
             <a:avLst/>
@@ -4363,7 +4327,7 @@
           <a:noFill/>
         </p:spPr>
         <p:txBody>
-          <a:bodyPr wrap="none" rtlCol="0">
+          <a:bodyPr wrap="square" rtlCol="0">
             <a:spAutoFit/>
           </a:bodyPr>
           <a:lstStyle/>
@@ -4394,7 +4358,7 @@
         </p:nvSpPr>
         <p:spPr>
           <a:xfrm>
-            <a:off x="5868027" y="4078373"/>
+            <a:off x="6247261" y="3992365"/>
             <a:ext cx="412292" cy="276999"/>
           </a:xfrm>
           <a:prstGeom prst="rect">
@@ -4436,13 +4400,13 @@
         </p:nvCxnSpPr>
         <p:spPr>
           <a:xfrm flipV="1">
-            <a:off x="9998141" y="1773762"/>
-            <a:ext cx="1120451" cy="749750"/>
+            <a:off x="10247016" y="1694403"/>
+            <a:ext cx="692898" cy="782809"/>
           </a:xfrm>
           <a:prstGeom prst="straightConnector1">
             <a:avLst/>
           </a:prstGeom>
-          <a:ln w="19050">
+          <a:ln w="28575">
             <a:tailEnd type="triangle"/>
           </a:ln>
         </p:spPr>
@@ -4475,7 +4439,7 @@
         </p:nvSpPr>
         <p:spPr>
           <a:xfrm>
-            <a:off x="10102560" y="2010137"/>
+            <a:off x="10194962" y="1972021"/>
             <a:ext cx="412292" cy="276999"/>
           </a:xfrm>
           <a:prstGeom prst="rect">
@@ -4515,7 +4479,7 @@
         </p:nvSpPr>
         <p:spPr>
           <a:xfrm>
-            <a:off x="11081846" y="1593291"/>
+            <a:off x="10909463" y="1474755"/>
             <a:ext cx="878767" cy="276999"/>
           </a:xfrm>
           <a:prstGeom prst="rect">
@@ -4552,7 +4516,7 @@
         </p:nvSpPr>
         <p:spPr>
           <a:xfrm>
-            <a:off x="9977302" y="2467607"/>
+            <a:off x="10247016" y="2441581"/>
             <a:ext cx="1678665" cy="276999"/>
           </a:xfrm>
           <a:prstGeom prst="rect">
@@ -4593,8 +4557,8 @@
         </p:nvSpPr>
         <p:spPr>
           <a:xfrm>
-            <a:off x="5176583" y="3359817"/>
-            <a:ext cx="532435" cy="520957"/>
+            <a:off x="6142604" y="3252555"/>
+            <a:ext cx="585679" cy="693394"/>
           </a:xfrm>
           <a:prstGeom prst="diamond">
             <a:avLst/>
@@ -4645,14 +4609,14 @@
         </p:nvSpPr>
         <p:spPr>
           <a:xfrm>
-            <a:off x="1480590" y="3439170"/>
+            <a:off x="1409747" y="4309457"/>
             <a:ext cx="471487" cy="428625"/>
           </a:xfrm>
           <a:prstGeom prst="ellipse">
             <a:avLst/>
           </a:prstGeom>
           <a:solidFill>
-            <a:srgbClr val="FFC000"/>
+            <a:schemeClr val="accent4"/>
           </a:solidFill>
           <a:ln w="28575">
             <a:solidFill>
@@ -4699,7 +4663,7 @@
         </p:nvSpPr>
         <p:spPr>
           <a:xfrm>
-            <a:off x="1177551" y="2877497"/>
+            <a:off x="1096232" y="3770091"/>
             <a:ext cx="1379976" cy="461665"/>
           </a:xfrm>
           <a:prstGeom prst="rect">
@@ -4738,13 +4702,361 @@
         </p:nvCxnSpPr>
         <p:spPr>
           <a:xfrm>
-            <a:off x="772949" y="3653480"/>
-            <a:ext cx="718878" cy="2"/>
+            <a:off x="905165" y="4512618"/>
+            <a:ext cx="491004" cy="2"/>
           </a:xfrm>
           <a:prstGeom prst="straightConnector1">
             <a:avLst/>
           </a:prstGeom>
-          <a:ln w="19050">
+          <a:ln w="28575">
+            <a:tailEnd type="triangle"/>
+          </a:ln>
+        </p:spPr>
+        <p:style>
+          <a:lnRef idx="1">
+            <a:schemeClr val="accent1"/>
+          </a:lnRef>
+          <a:fillRef idx="0">
+            <a:schemeClr val="accent1"/>
+          </a:fillRef>
+          <a:effectRef idx="0">
+            <a:schemeClr val="accent1"/>
+          </a:effectRef>
+          <a:fontRef idx="minor">
+            <a:schemeClr val="tx1"/>
+          </a:fontRef>
+        </p:style>
+      </p:cxnSp>
+      <p:sp>
+        <p:nvSpPr>
+          <p:cNvPr id="38" name="TextBox 37">
+            <a:extLst>
+              <a:ext uri="{FF2B5EF4-FFF2-40B4-BE49-F238E27FC236}">
+                <a16:creationId xmlns:a16="http://schemas.microsoft.com/office/drawing/2014/main" id="{D0837B88-2DB9-0FDB-0389-0486E9AFD2A5}"/>
+              </a:ext>
+            </a:extLst>
+          </p:cNvPr>
+          <p:cNvSpPr txBox="1"/>
+          <p:nvPr/>
+        </p:nvSpPr>
+        <p:spPr>
+          <a:xfrm>
+            <a:off x="3162887" y="4259367"/>
+            <a:ext cx="1007007" cy="276999"/>
+          </a:xfrm>
+          <a:prstGeom prst="rect">
+            <a:avLst/>
+          </a:prstGeom>
+          <a:noFill/>
+        </p:spPr>
+        <p:txBody>
+          <a:bodyPr wrap="none" rtlCol="0">
+            <a:spAutoFit/>
+          </a:bodyPr>
+          <a:lstStyle/>
+          <a:p>
+            <a:r>
+              <a:rPr lang="en-US" sz="1200" b="1" dirty="0">
+                <a:solidFill>
+                  <a:schemeClr val="accent2"/>
+                </a:solidFill>
+                <a:latin typeface="Lucida Handwriting" panose="03010101010101010101" pitchFamily="66" charset="77"/>
+              </a:rPr>
+              <a:t>Is  Toxic?</a:t>
+            </a:r>
+          </a:p>
+        </p:txBody>
+      </p:sp>
+      <p:cxnSp>
+        <p:nvCxnSpPr>
+          <p:cNvPr id="44" name="Straight Arrow Connector 43">
+            <a:extLst>
+              <a:ext uri="{FF2B5EF4-FFF2-40B4-BE49-F238E27FC236}">
+                <a16:creationId xmlns:a16="http://schemas.microsoft.com/office/drawing/2014/main" id="{F2998C8F-13CE-A805-9171-9D692FD62333}"/>
+              </a:ext>
+            </a:extLst>
+          </p:cNvPr>
+          <p:cNvCxnSpPr>
+            <a:cxnSpLocks/>
+          </p:cNvCxnSpPr>
+          <p:nvPr/>
+        </p:nvCxnSpPr>
+        <p:spPr>
+          <a:xfrm flipV="1">
+            <a:off x="2884600" y="3602098"/>
+            <a:ext cx="725097" cy="792357"/>
+          </a:xfrm>
+          <a:prstGeom prst="straightConnector1">
+            <a:avLst/>
+          </a:prstGeom>
+          <a:ln w="28575">
+            <a:tailEnd type="triangle"/>
+          </a:ln>
+        </p:spPr>
+        <p:style>
+          <a:lnRef idx="1">
+            <a:schemeClr val="accent1"/>
+          </a:lnRef>
+          <a:fillRef idx="0">
+            <a:schemeClr val="accent1"/>
+          </a:fillRef>
+          <a:effectRef idx="0">
+            <a:schemeClr val="accent1"/>
+          </a:effectRef>
+          <a:fontRef idx="minor">
+            <a:schemeClr val="tx1"/>
+          </a:fontRef>
+        </p:style>
+      </p:cxnSp>
+      <p:sp>
+        <p:nvSpPr>
+          <p:cNvPr id="45" name="TextBox 44">
+            <a:extLst>
+              <a:ext uri="{FF2B5EF4-FFF2-40B4-BE49-F238E27FC236}">
+                <a16:creationId xmlns:a16="http://schemas.microsoft.com/office/drawing/2014/main" id="{493D3853-59E8-D159-C8F0-F92FC3BECB84}"/>
+              </a:ext>
+            </a:extLst>
+          </p:cNvPr>
+          <p:cNvSpPr txBox="1"/>
+          <p:nvPr/>
+        </p:nvSpPr>
+        <p:spPr>
+          <a:xfrm>
+            <a:off x="2817222" y="4892443"/>
+            <a:ext cx="429926" cy="276999"/>
+          </a:xfrm>
+          <a:prstGeom prst="rect">
+            <a:avLst/>
+          </a:prstGeom>
+          <a:noFill/>
+        </p:spPr>
+        <p:txBody>
+          <a:bodyPr wrap="none" rtlCol="0">
+            <a:spAutoFit/>
+          </a:bodyPr>
+          <a:lstStyle/>
+          <a:p>
+            <a:r>
+              <a:rPr lang="en-US" sz="1200" dirty="0">
+                <a:solidFill>
+                  <a:srgbClr val="00B050"/>
+                </a:solidFill>
+                <a:latin typeface="Lucida Handwriting" panose="03010101010101010101" pitchFamily="66" charset="77"/>
+              </a:rPr>
+              <a:t>Yes</a:t>
+            </a:r>
+          </a:p>
+        </p:txBody>
+      </p:sp>
+      <p:sp>
+        <p:nvSpPr>
+          <p:cNvPr id="52" name="Rounded Rectangle 51">
+            <a:extLst>
+              <a:ext uri="{FF2B5EF4-FFF2-40B4-BE49-F238E27FC236}">
+                <a16:creationId xmlns:a16="http://schemas.microsoft.com/office/drawing/2014/main" id="{9DD1BC2F-3068-2D94-AEEC-4C4A27706269}"/>
+              </a:ext>
+            </a:extLst>
+          </p:cNvPr>
+          <p:cNvSpPr/>
+          <p:nvPr/>
+        </p:nvSpPr>
+        <p:spPr>
+          <a:xfrm>
+            <a:off x="3566849" y="5109033"/>
+            <a:ext cx="670349" cy="358816"/>
+          </a:xfrm>
+          <a:prstGeom prst="roundRect">
+            <a:avLst/>
+          </a:prstGeom>
+          <a:solidFill>
+            <a:srgbClr val="00B0F0"/>
+          </a:solidFill>
+        </p:spPr>
+        <p:style>
+          <a:lnRef idx="2">
+            <a:schemeClr val="accent1">
+              <a:shade val="15000"/>
+            </a:schemeClr>
+          </a:lnRef>
+          <a:fillRef idx="1">
+            <a:schemeClr val="accent1"/>
+          </a:fillRef>
+          <a:effectRef idx="0">
+            <a:schemeClr val="accent1"/>
+          </a:effectRef>
+          <a:fontRef idx="minor">
+            <a:schemeClr val="lt1"/>
+          </a:fontRef>
+        </p:style>
+        <p:txBody>
+          <a:bodyPr rtlCol="0" anchor="ctr"/>
+          <a:lstStyle/>
+          <a:p>
+            <a:pPr algn="ctr"/>
+            <a:r>
+              <a:rPr lang="en-US" dirty="0"/>
+              <a:t>END</a:t>
+            </a:r>
+          </a:p>
+        </p:txBody>
+      </p:sp>
+      <p:cxnSp>
+        <p:nvCxnSpPr>
+          <p:cNvPr id="53" name="Straight Arrow Connector 52">
+            <a:extLst>
+              <a:ext uri="{FF2B5EF4-FFF2-40B4-BE49-F238E27FC236}">
+                <a16:creationId xmlns:a16="http://schemas.microsoft.com/office/drawing/2014/main" id="{BE5641A3-203C-162C-5BDB-170145D4BBD2}"/>
+              </a:ext>
+            </a:extLst>
+          </p:cNvPr>
+          <p:cNvCxnSpPr>
+            <a:cxnSpLocks/>
+            <a:endCxn id="52" idx="1"/>
+          </p:cNvCxnSpPr>
+          <p:nvPr/>
+        </p:nvCxnSpPr>
+        <p:spPr>
+          <a:xfrm>
+            <a:off x="2913507" y="4598597"/>
+            <a:ext cx="653342" cy="689844"/>
+          </a:xfrm>
+          <a:prstGeom prst="straightConnector1">
+            <a:avLst/>
+          </a:prstGeom>
+          <a:ln w="28575">
+            <a:tailEnd type="triangle"/>
+          </a:ln>
+        </p:spPr>
+        <p:style>
+          <a:lnRef idx="1">
+            <a:schemeClr val="accent1"/>
+          </a:lnRef>
+          <a:fillRef idx="0">
+            <a:schemeClr val="accent1"/>
+          </a:fillRef>
+          <a:effectRef idx="0">
+            <a:schemeClr val="accent1"/>
+          </a:effectRef>
+          <a:fontRef idx="minor">
+            <a:schemeClr val="tx1"/>
+          </a:fontRef>
+        </p:style>
+      </p:cxnSp>
+      <p:sp>
+        <p:nvSpPr>
+          <p:cNvPr id="54" name="TextBox 53">
+            <a:extLst>
+              <a:ext uri="{FF2B5EF4-FFF2-40B4-BE49-F238E27FC236}">
+                <a16:creationId xmlns:a16="http://schemas.microsoft.com/office/drawing/2014/main" id="{6F609DAE-0301-5700-FBCF-2C94D73F9C9F}"/>
+              </a:ext>
+            </a:extLst>
+          </p:cNvPr>
+          <p:cNvSpPr txBox="1"/>
+          <p:nvPr/>
+        </p:nvSpPr>
+        <p:spPr>
+          <a:xfrm>
+            <a:off x="2876860" y="3731423"/>
+            <a:ext cx="412292" cy="276999"/>
+          </a:xfrm>
+          <a:prstGeom prst="rect">
+            <a:avLst/>
+          </a:prstGeom>
+          <a:noFill/>
+        </p:spPr>
+        <p:txBody>
+          <a:bodyPr wrap="none" rtlCol="0">
+            <a:spAutoFit/>
+          </a:bodyPr>
+          <a:lstStyle/>
+          <a:p>
+            <a:r>
+              <a:rPr lang="en-US" sz="1200" dirty="0">
+                <a:solidFill>
+                  <a:srgbClr val="FF0000"/>
+                </a:solidFill>
+                <a:latin typeface="Lucida Handwriting" panose="03010101010101010101" pitchFamily="66" charset="77"/>
+              </a:rPr>
+              <a:t>No</a:t>
+            </a:r>
+          </a:p>
+        </p:txBody>
+      </p:sp>
+      <p:sp>
+        <p:nvSpPr>
+          <p:cNvPr id="55" name="Diamond 54">
+            <a:extLst>
+              <a:ext uri="{FF2B5EF4-FFF2-40B4-BE49-F238E27FC236}">
+                <a16:creationId xmlns:a16="http://schemas.microsoft.com/office/drawing/2014/main" id="{C28BA26A-FD52-EBC0-0604-376DE9A43FCC}"/>
+              </a:ext>
+            </a:extLst>
+          </p:cNvPr>
+          <p:cNvSpPr/>
+          <p:nvPr/>
+        </p:nvSpPr>
+        <p:spPr>
+          <a:xfrm>
+            <a:off x="2483948" y="4163235"/>
+            <a:ext cx="585679" cy="693394"/>
+          </a:xfrm>
+          <a:prstGeom prst="diamond">
+            <a:avLst/>
+          </a:prstGeom>
+          <a:solidFill>
+            <a:schemeClr val="accent2"/>
+          </a:solidFill>
+          <a:ln>
+            <a:noFill/>
+          </a:ln>
+        </p:spPr>
+        <p:style>
+          <a:lnRef idx="2">
+            <a:schemeClr val="accent1">
+              <a:shade val="15000"/>
+            </a:schemeClr>
+          </a:lnRef>
+          <a:fillRef idx="1">
+            <a:schemeClr val="accent1"/>
+          </a:fillRef>
+          <a:effectRef idx="0">
+            <a:schemeClr val="accent1"/>
+          </a:effectRef>
+          <a:fontRef idx="minor">
+            <a:schemeClr val="lt1"/>
+          </a:fontRef>
+        </p:style>
+        <p:txBody>
+          <a:bodyPr rtlCol="0" anchor="ctr"/>
+          <a:lstStyle/>
+          <a:p>
+            <a:pPr algn="ctr"/>
+            <a:endParaRPr lang="en-US"/>
+          </a:p>
+        </p:txBody>
+      </p:sp>
+      <p:cxnSp>
+        <p:nvCxnSpPr>
+          <p:cNvPr id="59" name="Straight Arrow Connector 58">
+            <a:extLst>
+              <a:ext uri="{FF2B5EF4-FFF2-40B4-BE49-F238E27FC236}">
+                <a16:creationId xmlns:a16="http://schemas.microsoft.com/office/drawing/2014/main" id="{42763E87-0240-5D89-953D-48CE4F44D2DA}"/>
+              </a:ext>
+            </a:extLst>
+          </p:cNvPr>
+          <p:cNvCxnSpPr>
+            <a:cxnSpLocks/>
+          </p:cNvCxnSpPr>
+          <p:nvPr/>
+        </p:nvCxnSpPr>
+        <p:spPr>
+          <a:xfrm>
+            <a:off x="1899694" y="4502845"/>
+            <a:ext cx="594114" cy="2"/>
+          </a:xfrm>
+          <a:prstGeom prst="straightConnector1">
+            <a:avLst/>
+          </a:prstGeom>
+          <a:ln w="28575">
             <a:tailEnd type="triangle"/>
           </a:ln>
         </p:spPr>

</xml_diff>